<commit_message>
Final versions of OPP and TIF-Ignite, +.gitignore
</commit_message>
<xml_diff>
--- a/OnlinePrePurchasing.pptx
+++ b/OnlinePrePurchasing.pptx
@@ -4472,7 +4472,60 @@
           <a:p>
             <a:r>
               <a:rPr lang="en-US" dirty="0" smtClean="0"/>
-              <a:t>(Show pretty graphics on GitHub)</a:t>
+              <a:t>First code sprint 8/18-19</a:t>
+            </a:r>
+          </a:p>
+          <a:p>
+            <a:pPr lvl="1"/>
+            <a:r>
+              <a:rPr lang="en-US" dirty="0">
+                <a:hlinkClick r:id="rId2"/>
+              </a:rPr>
+              <a:t>https://</a:t>
+            </a:r>
+            <a:r>
+              <a:rPr lang="en-US" dirty="0" smtClean="0">
+                <a:hlinkClick r:id="rId2"/>
+              </a:rPr>
+              <a:t>github.com/ucdavis/Purchasing/wiki/Sprint-8-18-and-8-19</a:t>
+            </a:r>
+            <a:endParaRPr lang="en-US" dirty="0" smtClean="0"/>
+          </a:p>
+          <a:p>
+            <a:r>
+              <a:rPr lang="en-US" dirty="0" smtClean="0"/>
+              <a:t>Commit impact graph</a:t>
+            </a:r>
+          </a:p>
+          <a:p>
+            <a:pPr lvl="1"/>
+            <a:r>
+              <a:rPr lang="en-US" dirty="0">
+                <a:hlinkClick r:id="rId3"/>
+              </a:rPr>
+              <a:t>https://</a:t>
+            </a:r>
+            <a:r>
+              <a:rPr lang="en-US" dirty="0" smtClean="0">
+                <a:hlinkClick r:id="rId3"/>
+              </a:rPr>
+              <a:t>github.com/ucdavis/Purchasing/graphs/impact</a:t>
+            </a:r>
+            <a:endParaRPr lang="en-US" dirty="0" smtClean="0"/>
+          </a:p>
+          <a:p>
+            <a:r>
+              <a:rPr lang="en-US" dirty="0" smtClean="0"/>
+              <a:t>Infrastructure</a:t>
+            </a:r>
+          </a:p>
+          <a:p>
+            <a:pPr lvl="1"/>
+            <a:r>
+              <a:rPr lang="en-US" dirty="0">
+                <a:hlinkClick r:id="rId4"/>
+              </a:rPr>
+              <a:t>https://github.com/ucdavis/Purchasing/wiki/Infrastructure</a:t>
             </a:r>
             <a:endParaRPr lang="en-US" dirty="0"/>
           </a:p>
@@ -4688,11 +4741,7 @@
           <a:p>
             <a:r>
               <a:rPr lang="en-US" sz="2400" dirty="0" smtClean="0"/>
-              <a:t>Scott Dyer</a:t>
-            </a:r>
-            <a:r>
-              <a:rPr lang="en-US" sz="2400" smtClean="0"/>
-              <a:t>, programmer</a:t>
+              <a:t>Scott Dyer, programmer</a:t>
             </a:r>
             <a:endParaRPr lang="en-US" sz="2400" dirty="0"/>
           </a:p>
@@ -4760,8 +4809,19 @@
             </a:pPr>
             <a:r>
               <a:rPr lang="en-US" sz="2400" dirty="0" smtClean="0"/>
-              <a:t>(see humans.txt)</a:t>
-            </a:r>
+              <a:t>(see </a:t>
+            </a:r>
+            <a:r>
+              <a:rPr lang="en-US" sz="2400" dirty="0">
+                <a:hlinkClick r:id="rId2"/>
+              </a:rPr>
+              <a:t>http://prepurchasing.ucdavis.edu/humans.txt</a:t>
+            </a:r>
+            <a:r>
+              <a:rPr lang="en-US" sz="2400" dirty="0" smtClean="0"/>
+              <a:t>)</a:t>
+            </a:r>
+            <a:endParaRPr lang="en-US" sz="2400" dirty="0" smtClean="0"/>
           </a:p>
           <a:p>
             <a:pPr marL="0" indent="0">
@@ -5094,12 +5154,12 @@
               <a:t>, </a:t>
             </a:r>
             <a:r>
-              <a:rPr lang="en-US" sz="2400" dirty="0" err="1" smtClean="0"/>
-              <a:t>RESTful</a:t>
-            </a:r>
-            <a:r>
               <a:rPr lang="en-US" sz="2400" dirty="0" smtClean="0"/>
-              <a:t> web services</a:t>
+              <a:t>web </a:t>
+            </a:r>
+            <a:r>
+              <a:rPr lang="en-US" sz="2400" dirty="0" smtClean="0"/>
+              <a:t>services</a:t>
             </a:r>
           </a:p>
           <a:p>

</xml_diff>